<commit_message>
Added slides for beggining of presentation
</commit_message>
<xml_diff>
--- a/pcie_seanlink_davidstockhouse.pptx
+++ b/pcie_seanlink_davidstockhouse.pptx
@@ -6,10 +6,12 @@
   </p:sldMasterIdLst>
   <p:sldIdLst>
     <p:sldId id="256" r:id="rId2"/>
-    <p:sldId id="260" r:id="rId3"/>
-    <p:sldId id="257" r:id="rId4"/>
-    <p:sldId id="258" r:id="rId5"/>
-    <p:sldId id="259" r:id="rId6"/>
+    <p:sldId id="261" r:id="rId3"/>
+    <p:sldId id="260" r:id="rId4"/>
+    <p:sldId id="262" r:id="rId5"/>
+    <p:sldId id="257" r:id="rId6"/>
+    <p:sldId id="258" r:id="rId7"/>
+    <p:sldId id="259" r:id="rId8"/>
   </p:sldIdLst>
   <p:sldSz cx="12192000" cy="6858000"/>
   <p:notesSz cx="6858000" cy="9144000"/>
@@ -108,6 +110,11 @@
       </a:defRPr>
     </a:lvl9pPr>
   </p:defaultTextStyle>
+  <p:extLst>
+    <p:ext uri="{EFAFB233-063F-42B5-8137-9DF3F51BA10A}">
+      <p15:sldGuideLst xmlns:p15="http://schemas.microsoft.com/office/powerpoint/2012/main"/>
+    </p:ext>
+  </p:extLst>
 </p:presentation>
 </file>
 
@@ -242,7 +249,7 @@
           <a:p>
             <a:fld id="{6175EC6B-8FC9-4EBF-8D89-6FB629DFAA03}" type="datetimeFigureOut">
               <a:rPr lang="en-US" smtClean="0"/>
-              <a:t>4/17/2019</a:t>
+              <a:t>4/18/2019</a:t>
             </a:fld>
             <a:endParaRPr lang="en-US"/>
           </a:p>
@@ -412,7 +419,7 @@
           <a:p>
             <a:fld id="{6175EC6B-8FC9-4EBF-8D89-6FB629DFAA03}" type="datetimeFigureOut">
               <a:rPr lang="en-US" smtClean="0"/>
-              <a:t>4/17/2019</a:t>
+              <a:t>4/18/2019</a:t>
             </a:fld>
             <a:endParaRPr lang="en-US"/>
           </a:p>
@@ -592,7 +599,7 @@
           <a:p>
             <a:fld id="{6175EC6B-8FC9-4EBF-8D89-6FB629DFAA03}" type="datetimeFigureOut">
               <a:rPr lang="en-US" smtClean="0"/>
-              <a:t>4/17/2019</a:t>
+              <a:t>4/18/2019</a:t>
             </a:fld>
             <a:endParaRPr lang="en-US"/>
           </a:p>
@@ -762,7 +769,7 @@
           <a:p>
             <a:fld id="{6175EC6B-8FC9-4EBF-8D89-6FB629DFAA03}" type="datetimeFigureOut">
               <a:rPr lang="en-US" smtClean="0"/>
-              <a:t>4/17/2019</a:t>
+              <a:t>4/18/2019</a:t>
             </a:fld>
             <a:endParaRPr lang="en-US"/>
           </a:p>
@@ -1008,7 +1015,7 @@
           <a:p>
             <a:fld id="{6175EC6B-8FC9-4EBF-8D89-6FB629DFAA03}" type="datetimeFigureOut">
               <a:rPr lang="en-US" smtClean="0"/>
-              <a:t>4/17/2019</a:t>
+              <a:t>4/18/2019</a:t>
             </a:fld>
             <a:endParaRPr lang="en-US"/>
           </a:p>
@@ -1240,7 +1247,7 @@
           <a:p>
             <a:fld id="{6175EC6B-8FC9-4EBF-8D89-6FB629DFAA03}" type="datetimeFigureOut">
               <a:rPr lang="en-US" smtClean="0"/>
-              <a:t>4/17/2019</a:t>
+              <a:t>4/18/2019</a:t>
             </a:fld>
             <a:endParaRPr lang="en-US"/>
           </a:p>
@@ -1607,7 +1614,7 @@
           <a:p>
             <a:fld id="{6175EC6B-8FC9-4EBF-8D89-6FB629DFAA03}" type="datetimeFigureOut">
               <a:rPr lang="en-US" smtClean="0"/>
-              <a:t>4/17/2019</a:t>
+              <a:t>4/18/2019</a:t>
             </a:fld>
             <a:endParaRPr lang="en-US"/>
           </a:p>
@@ -1725,7 +1732,7 @@
           <a:p>
             <a:fld id="{6175EC6B-8FC9-4EBF-8D89-6FB629DFAA03}" type="datetimeFigureOut">
               <a:rPr lang="en-US" smtClean="0"/>
-              <a:t>4/17/2019</a:t>
+              <a:t>4/18/2019</a:t>
             </a:fld>
             <a:endParaRPr lang="en-US"/>
           </a:p>
@@ -1820,7 +1827,7 @@
           <a:p>
             <a:fld id="{6175EC6B-8FC9-4EBF-8D89-6FB629DFAA03}" type="datetimeFigureOut">
               <a:rPr lang="en-US" smtClean="0"/>
-              <a:t>4/17/2019</a:t>
+              <a:t>4/18/2019</a:t>
             </a:fld>
             <a:endParaRPr lang="en-US"/>
           </a:p>
@@ -2097,7 +2104,7 @@
           <a:p>
             <a:fld id="{6175EC6B-8FC9-4EBF-8D89-6FB629DFAA03}" type="datetimeFigureOut">
               <a:rPr lang="en-US" smtClean="0"/>
-              <a:t>4/17/2019</a:t>
+              <a:t>4/18/2019</a:t>
             </a:fld>
             <a:endParaRPr lang="en-US"/>
           </a:p>
@@ -2354,7 +2361,7 @@
           <a:p>
             <a:fld id="{6175EC6B-8FC9-4EBF-8D89-6FB629DFAA03}" type="datetimeFigureOut">
               <a:rPr lang="en-US" smtClean="0"/>
-              <a:t>4/17/2019</a:t>
+              <a:t>4/18/2019</a:t>
             </a:fld>
             <a:endParaRPr lang="en-US"/>
           </a:p>
@@ -2567,7 +2574,7 @@
           <a:p>
             <a:fld id="{6175EC6B-8FC9-4EBF-8D89-6FB629DFAA03}" type="datetimeFigureOut">
               <a:rPr lang="en-US" smtClean="0"/>
-              <a:t>4/17/2019</a:t>
+              <a:t>4/18/2019</a:t>
             </a:fld>
             <a:endParaRPr lang="en-US"/>
           </a:p>
@@ -2988,7 +2995,7 @@
                 <a16:creationId xmlns:a16="http://schemas.microsoft.com/office/drawing/2014/main" id="{2A8AA5BC-4F7A-4226-8F99-6D824B226A97}"/>
               </a:ext>
               <a:ext uri="{C183D7F6-B498-43B3-948B-1728B52AA6E4}">
-                <adec:decorative xmlns:adec="http://schemas.microsoft.com/office/drawing/2017/decorative" val="1"/>
+                <adec:decorative xmlns:adec="http://schemas.microsoft.com/office/drawing/2017/decorative" xmlns="" val="1"/>
               </a:ext>
             </a:extLst>
           </p:cNvPr>
@@ -3051,7 +3058,7 @@
                 <a16:creationId xmlns:a16="http://schemas.microsoft.com/office/drawing/2014/main" id="{3E5445C6-DD42-4979-86FF-03730E8C6DB0}"/>
               </a:ext>
               <a:ext uri="{C183D7F6-B498-43B3-948B-1728B52AA6E4}">
-                <adec:decorative xmlns:adec="http://schemas.microsoft.com/office/drawing/2017/decorative" val="1"/>
+                <adec:decorative xmlns:adec="http://schemas.microsoft.com/office/drawing/2017/decorative" xmlns="" val="1"/>
               </a:ext>
             </a:extLst>
           </p:cNvPr>
@@ -3132,7 +3139,7 @@
         </p:nvSpPr>
         <p:spPr>
           <a:xfrm>
-            <a:off x="1524000" y="1122362"/>
+            <a:off x="1536478" y="869066"/>
             <a:ext cx="9144000" cy="2840037"/>
           </a:xfrm>
         </p:spPr>
@@ -3143,7 +3150,7 @@
           <a:lstStyle/>
           <a:p>
             <a:r>
-              <a:rPr lang="en-US" sz="5800"/>
+              <a:rPr lang="en-US" sz="8000" dirty="0"/>
               <a:t>PCI Express</a:t>
             </a:r>
           </a:p>
@@ -3178,23 +3185,20 @@
           <a:lstStyle/>
           <a:p>
             <a:r>
-              <a:rPr lang="en-US">
-                <a:solidFill>
-                  <a:schemeClr val="accent1"/>
-                </a:solidFill>
-              </a:rPr>
+              <a:rPr lang="en-US" sz="4000" dirty="0"/>
               <a:t>Sean Link</a:t>
             </a:r>
           </a:p>
           <a:p>
             <a:r>
-              <a:rPr lang="en-US">
-                <a:solidFill>
-                  <a:schemeClr val="accent1"/>
-                </a:solidFill>
-              </a:rPr>
-              <a:t>David Stockhouse</a:t>
-            </a:r>
+              <a:rPr lang="en-US" sz="4000" dirty="0"/>
+              <a:t>David </a:t>
+            </a:r>
+            <a:r>
+              <a:rPr lang="en-US" sz="4000" dirty="0" err="1"/>
+              <a:t>Stockhouse</a:t>
+            </a:r>
+            <a:endParaRPr lang="en-US" sz="4000" dirty="0"/>
           </a:p>
         </p:txBody>
       </p:sp>
@@ -3206,7 +3210,7 @@
                 <a16:creationId xmlns:a16="http://schemas.microsoft.com/office/drawing/2014/main" id="{45000665-DFC7-417E-8FD7-516A0F15C975}"/>
               </a:ext>
               <a:ext uri="{C183D7F6-B498-43B3-948B-1728B52AA6E4}">
-                <adec:decorative xmlns:adec="http://schemas.microsoft.com/office/drawing/2017/decorative" val="1"/>
+                <adec:decorative xmlns:adec="http://schemas.microsoft.com/office/drawing/2017/decorative" xmlns="" val="1"/>
               </a:ext>
             </a:extLst>
           </p:cNvPr>
@@ -3284,6 +3288,114 @@
       </p:grpSpPr>
       <p:sp>
         <p:nvSpPr>
+          <p:cNvPr id="2" name="Title 1"/>
+          <p:cNvSpPr>
+            <a:spLocks noGrp="1"/>
+          </p:cNvSpPr>
+          <p:nvPr>
+            <p:ph type="title"/>
+          </p:nvPr>
+        </p:nvSpPr>
+        <p:spPr/>
+        <p:txBody>
+          <a:bodyPr>
+            <a:normAutofit/>
+          </a:bodyPr>
+          <a:lstStyle/>
+          <a:p>
+            <a:r>
+              <a:rPr lang="en-US" sz="7200" dirty="0" smtClean="0"/>
+              <a:t>Overview</a:t>
+            </a:r>
+            <a:endParaRPr lang="en-US" sz="7200" dirty="0"/>
+          </a:p>
+        </p:txBody>
+      </p:sp>
+      <p:sp>
+        <p:nvSpPr>
+          <p:cNvPr id="3" name="Content Placeholder 2"/>
+          <p:cNvSpPr>
+            <a:spLocks noGrp="1"/>
+          </p:cNvSpPr>
+          <p:nvPr>
+            <p:ph idx="1"/>
+          </p:nvPr>
+        </p:nvSpPr>
+        <p:spPr/>
+        <p:txBody>
+          <a:bodyPr>
+            <a:normAutofit/>
+          </a:bodyPr>
+          <a:lstStyle/>
+          <a:p>
+            <a:r>
+              <a:rPr lang="en-US" sz="3600" dirty="0" smtClean="0"/>
+              <a:t>Sean</a:t>
+            </a:r>
+          </a:p>
+          <a:p>
+            <a:pPr lvl="1"/>
+            <a:r>
+              <a:rPr lang="en-US" sz="3200" dirty="0" smtClean="0"/>
+              <a:t>Why PCI -&gt; </a:t>
+            </a:r>
+            <a:r>
+              <a:rPr lang="en-US" sz="3200" dirty="0" err="1" smtClean="0"/>
+              <a:t>PCIe</a:t>
+            </a:r>
+            <a:endParaRPr lang="en-US" sz="3200" dirty="0" smtClean="0"/>
+          </a:p>
+          <a:p>
+            <a:pPr lvl="1"/>
+            <a:r>
+              <a:rPr lang="en-US" sz="3200" dirty="0" smtClean="0"/>
+              <a:t>Small nuances and confusion about backwards compatibility (software vs hardware)</a:t>
+            </a:r>
+          </a:p>
+          <a:p>
+            <a:r>
+              <a:rPr lang="en-US" sz="3600" dirty="0" smtClean="0"/>
+              <a:t>David</a:t>
+            </a:r>
+          </a:p>
+          <a:p>
+            <a:pPr lvl="1"/>
+            <a:endParaRPr lang="en-US" sz="3200" dirty="0" smtClean="0"/>
+          </a:p>
+        </p:txBody>
+      </p:sp>
+    </p:spTree>
+    <p:extLst>
+      <p:ext uri="{BB962C8B-B14F-4D97-AF65-F5344CB8AC3E}">
+        <p14:creationId xmlns:p14="http://schemas.microsoft.com/office/powerpoint/2010/main" val="1628305366"/>
+      </p:ext>
+    </p:extLst>
+  </p:cSld>
+  <p:clrMapOvr>
+    <a:masterClrMapping/>
+  </p:clrMapOvr>
+</p:sld>
+</file>
+
+<file path=ppt/slides/slide3.xml><?xml version="1.0" encoding="utf-8"?>
+<p:sld xmlns:a="http://schemas.openxmlformats.org/drawingml/2006/main" xmlns:r="http://schemas.openxmlformats.org/officeDocument/2006/relationships" xmlns:p="http://schemas.openxmlformats.org/presentationml/2006/main">
+  <p:cSld>
+    <p:spTree>
+      <p:nvGrpSpPr>
+        <p:cNvPr id="1" name=""/>
+        <p:cNvGrpSpPr/>
+        <p:nvPr/>
+      </p:nvGrpSpPr>
+      <p:grpSpPr>
+        <a:xfrm>
+          <a:off x="0" y="0"/>
+          <a:ext cx="0" cy="0"/>
+          <a:chOff x="0" y="0"/>
+          <a:chExt cx="0" cy="0"/>
+        </a:xfrm>
+      </p:grpSpPr>
+      <p:sp>
+        <p:nvSpPr>
           <p:cNvPr id="2" name="Title 1">
             <a:extLst>
               <a:ext uri="{FF2B5EF4-FFF2-40B4-BE49-F238E27FC236}">
@@ -3304,9 +3416,14 @@
           <a:lstStyle/>
           <a:p>
             <a:r>
-              <a:rPr lang="en-US" dirty="0"/>
-              <a:t>Introduction</a:t>
-            </a:r>
+              <a:rPr lang="en-US" dirty="0" smtClean="0"/>
+              <a:t>Why PCI-&gt;</a:t>
+            </a:r>
+            <a:r>
+              <a:rPr lang="en-US" dirty="0" err="1" smtClean="0"/>
+              <a:t>PCIe</a:t>
+            </a:r>
+            <a:endParaRPr lang="en-US" dirty="0"/>
           </a:p>
         </p:txBody>
       </p:sp>
@@ -3337,17 +3454,40 @@
           <a:lstStyle/>
           <a:p>
             <a:r>
-              <a:rPr lang="en-US" dirty="0"/>
-              <a:t>Serial better for high speeds</a:t>
-            </a:r>
-          </a:p>
-          <a:p>
-            <a:r>
-              <a:rPr lang="en-US" dirty="0"/>
-              <a:t>Not a true bus – emulated using switches</a:t>
-            </a:r>
-          </a:p>
-          <a:p>
+              <a:rPr lang="en-US" sz="3200" dirty="0" smtClean="0"/>
+              <a:t>PCI </a:t>
+            </a:r>
+          </a:p>
+          <a:p>
+            <a:pPr lvl="1"/>
+            <a:r>
+              <a:rPr lang="en-US" sz="3200" dirty="0"/>
+              <a:t>T</a:t>
+            </a:r>
+            <a:r>
+              <a:rPr lang="en-US" sz="3200" dirty="0" smtClean="0"/>
+              <a:t>he bus shortcomings</a:t>
+            </a:r>
+          </a:p>
+          <a:p>
+            <a:r>
+              <a:rPr lang="en-US" sz="3200" dirty="0" err="1" smtClean="0"/>
+              <a:t>PCIe</a:t>
+            </a:r>
+            <a:endParaRPr lang="en-US" sz="3200" dirty="0" smtClean="0"/>
+          </a:p>
+          <a:p>
+            <a:pPr lvl="1"/>
+            <a:r>
+              <a:rPr lang="en-US" sz="3200" dirty="0" smtClean="0"/>
+              <a:t>Point to point. Simulated bus.</a:t>
+            </a:r>
+            <a:endParaRPr lang="en-US" sz="3200" dirty="0"/>
+          </a:p>
+          <a:p>
+            <a:pPr marL="0" indent="0">
+              <a:buNone/>
+            </a:pPr>
             <a:endParaRPr lang="en-US" dirty="0"/>
           </a:p>
         </p:txBody>
@@ -3459,7 +3599,106 @@
 </p:sld>
 </file>
 
-<file path=ppt/slides/slide3.xml><?xml version="1.0" encoding="utf-8"?>
+<file path=ppt/slides/slide4.xml><?xml version="1.0" encoding="utf-8"?>
+<p:sld xmlns:a="http://schemas.openxmlformats.org/drawingml/2006/main" xmlns:r="http://schemas.openxmlformats.org/officeDocument/2006/relationships" xmlns:p="http://schemas.openxmlformats.org/presentationml/2006/main">
+  <p:cSld>
+    <p:spTree>
+      <p:nvGrpSpPr>
+        <p:cNvPr id="1" name=""/>
+        <p:cNvGrpSpPr/>
+        <p:nvPr/>
+      </p:nvGrpSpPr>
+      <p:grpSpPr>
+        <a:xfrm>
+          <a:off x="0" y="0"/>
+          <a:ext cx="0" cy="0"/>
+          <a:chOff x="0" y="0"/>
+          <a:chExt cx="0" cy="0"/>
+        </a:xfrm>
+      </p:grpSpPr>
+      <p:sp>
+        <p:nvSpPr>
+          <p:cNvPr id="2" name="Title 1"/>
+          <p:cNvSpPr>
+            <a:spLocks noGrp="1"/>
+          </p:cNvSpPr>
+          <p:nvPr>
+            <p:ph type="title"/>
+          </p:nvPr>
+        </p:nvSpPr>
+        <p:spPr/>
+        <p:txBody>
+          <a:bodyPr>
+            <a:normAutofit/>
+          </a:bodyPr>
+          <a:lstStyle/>
+          <a:p>
+            <a:r>
+              <a:rPr lang="en-US" sz="7200" dirty="0" smtClean="0"/>
+              <a:t>Backwards Compatible?</a:t>
+            </a:r>
+            <a:endParaRPr lang="en-US" sz="7200" dirty="0"/>
+          </a:p>
+        </p:txBody>
+      </p:sp>
+      <p:sp>
+        <p:nvSpPr>
+          <p:cNvPr id="3" name="Content Placeholder 2"/>
+          <p:cNvSpPr>
+            <a:spLocks noGrp="1"/>
+          </p:cNvSpPr>
+          <p:nvPr>
+            <p:ph idx="1"/>
+          </p:nvPr>
+        </p:nvSpPr>
+        <p:spPr/>
+        <p:txBody>
+          <a:bodyPr>
+            <a:normAutofit/>
+          </a:bodyPr>
+          <a:lstStyle/>
+          <a:p>
+            <a:r>
+              <a:rPr lang="en-US" sz="6000" dirty="0" smtClean="0"/>
+              <a:t>Software </a:t>
+            </a:r>
+          </a:p>
+          <a:p>
+            <a:pPr lvl="1"/>
+            <a:r>
+              <a:rPr lang="en-US" sz="5600" dirty="0" smtClean="0"/>
+              <a:t>Yes</a:t>
+            </a:r>
+          </a:p>
+          <a:p>
+            <a:r>
+              <a:rPr lang="en-US" sz="6000" dirty="0" smtClean="0"/>
+              <a:t>Hardware</a:t>
+            </a:r>
+          </a:p>
+          <a:p>
+            <a:pPr lvl="1"/>
+            <a:r>
+              <a:rPr lang="en-US" sz="5600" smtClean="0"/>
+              <a:t>No</a:t>
+            </a:r>
+          </a:p>
+        </p:txBody>
+      </p:sp>
+    </p:spTree>
+    <p:extLst>
+      <p:ext uri="{BB962C8B-B14F-4D97-AF65-F5344CB8AC3E}">
+        <p14:creationId xmlns:p14="http://schemas.microsoft.com/office/powerpoint/2010/main" val="2667667823"/>
+      </p:ext>
+    </p:extLst>
+  </p:cSld>
+  <p:clrMapOvr>
+    <a:masterClrMapping/>
+  </p:clrMapOvr>
+</p:sld>
+</file>
+
+<file path=ppt/slides/slide5.xml><?xml version="1.0" encoding="utf-8"?>
 <p:sld xmlns:a="http://schemas.openxmlformats.org/drawingml/2006/main" xmlns:r="http://schemas.openxmlformats.org/officeDocument/2006/relationships" xmlns:p="http://schemas.openxmlformats.org/presentationml/2006/main">
   <p:cSld>
     <p:spTree>
@@ -3643,7 +3882,7 @@
 </p:sld>
 </file>
 
-<file path=ppt/slides/slide4.xml><?xml version="1.0" encoding="utf-8"?>
+<file path=ppt/slides/slide6.xml><?xml version="1.0" encoding="utf-8"?>
 <p:sld xmlns:a="http://schemas.openxmlformats.org/drawingml/2006/main" xmlns:r="http://schemas.openxmlformats.org/officeDocument/2006/relationships" xmlns:p="http://schemas.openxmlformats.org/presentationml/2006/main">
   <p:cSld>
     <p:spTree>
@@ -3787,7 +4026,7 @@
 </p:sld>
 </file>
 
-<file path=ppt/slides/slide5.xml><?xml version="1.0" encoding="utf-8"?>
+<file path=ppt/slides/slide7.xml><?xml version="1.0" encoding="utf-8"?>
 <p:sld xmlns:a="http://schemas.openxmlformats.org/drawingml/2006/main" xmlns:r="http://schemas.openxmlformats.org/officeDocument/2006/relationships" xmlns:p="http://schemas.openxmlformats.org/presentationml/2006/main">
   <p:cSld>
     <p:spTree>

</xml_diff>

<commit_message>
Finishing up first draft of my section of presentation
</commit_message>
<xml_diff>
--- a/pcie_seanlink_davidstockhouse.pptx
+++ b/pcie_seanlink_davidstockhouse.pptx
@@ -10,8 +10,10 @@
     <p:sldId id="260" r:id="rId4"/>
     <p:sldId id="262" r:id="rId5"/>
     <p:sldId id="257" r:id="rId6"/>
-    <p:sldId id="258" r:id="rId7"/>
-    <p:sldId id="259" r:id="rId8"/>
+    <p:sldId id="259" r:id="rId7"/>
+    <p:sldId id="258" r:id="rId8"/>
+    <p:sldId id="264" r:id="rId9"/>
+    <p:sldId id="263" r:id="rId10"/>
   </p:sldIdLst>
   <p:sldSz cx="12192000" cy="6858000"/>
   <p:notesSz cx="6858000" cy="9144000"/>
@@ -249,7 +251,7 @@
           <a:p>
             <a:fld id="{6175EC6B-8FC9-4EBF-8D89-6FB629DFAA03}" type="datetimeFigureOut">
               <a:rPr lang="en-US" smtClean="0"/>
-              <a:t>4/18/2019</a:t>
+              <a:t>4/21/2019</a:t>
             </a:fld>
             <a:endParaRPr lang="en-US"/>
           </a:p>
@@ -419,7 +421,7 @@
           <a:p>
             <a:fld id="{6175EC6B-8FC9-4EBF-8D89-6FB629DFAA03}" type="datetimeFigureOut">
               <a:rPr lang="en-US" smtClean="0"/>
-              <a:t>4/18/2019</a:t>
+              <a:t>4/21/2019</a:t>
             </a:fld>
             <a:endParaRPr lang="en-US"/>
           </a:p>
@@ -599,7 +601,7 @@
           <a:p>
             <a:fld id="{6175EC6B-8FC9-4EBF-8D89-6FB629DFAA03}" type="datetimeFigureOut">
               <a:rPr lang="en-US" smtClean="0"/>
-              <a:t>4/18/2019</a:t>
+              <a:t>4/21/2019</a:t>
             </a:fld>
             <a:endParaRPr lang="en-US"/>
           </a:p>
@@ -769,7 +771,7 @@
           <a:p>
             <a:fld id="{6175EC6B-8FC9-4EBF-8D89-6FB629DFAA03}" type="datetimeFigureOut">
               <a:rPr lang="en-US" smtClean="0"/>
-              <a:t>4/18/2019</a:t>
+              <a:t>4/21/2019</a:t>
             </a:fld>
             <a:endParaRPr lang="en-US"/>
           </a:p>
@@ -1015,7 +1017,7 @@
           <a:p>
             <a:fld id="{6175EC6B-8FC9-4EBF-8D89-6FB629DFAA03}" type="datetimeFigureOut">
               <a:rPr lang="en-US" smtClean="0"/>
-              <a:t>4/18/2019</a:t>
+              <a:t>4/21/2019</a:t>
             </a:fld>
             <a:endParaRPr lang="en-US"/>
           </a:p>
@@ -1247,7 +1249,7 @@
           <a:p>
             <a:fld id="{6175EC6B-8FC9-4EBF-8D89-6FB629DFAA03}" type="datetimeFigureOut">
               <a:rPr lang="en-US" smtClean="0"/>
-              <a:t>4/18/2019</a:t>
+              <a:t>4/21/2019</a:t>
             </a:fld>
             <a:endParaRPr lang="en-US"/>
           </a:p>
@@ -1614,7 +1616,7 @@
           <a:p>
             <a:fld id="{6175EC6B-8FC9-4EBF-8D89-6FB629DFAA03}" type="datetimeFigureOut">
               <a:rPr lang="en-US" smtClean="0"/>
-              <a:t>4/18/2019</a:t>
+              <a:t>4/21/2019</a:t>
             </a:fld>
             <a:endParaRPr lang="en-US"/>
           </a:p>
@@ -1732,7 +1734,7 @@
           <a:p>
             <a:fld id="{6175EC6B-8FC9-4EBF-8D89-6FB629DFAA03}" type="datetimeFigureOut">
               <a:rPr lang="en-US" smtClean="0"/>
-              <a:t>4/18/2019</a:t>
+              <a:t>4/21/2019</a:t>
             </a:fld>
             <a:endParaRPr lang="en-US"/>
           </a:p>
@@ -1827,7 +1829,7 @@
           <a:p>
             <a:fld id="{6175EC6B-8FC9-4EBF-8D89-6FB629DFAA03}" type="datetimeFigureOut">
               <a:rPr lang="en-US" smtClean="0"/>
-              <a:t>4/18/2019</a:t>
+              <a:t>4/21/2019</a:t>
             </a:fld>
             <a:endParaRPr lang="en-US"/>
           </a:p>
@@ -2104,7 +2106,7 @@
           <a:p>
             <a:fld id="{6175EC6B-8FC9-4EBF-8D89-6FB629DFAA03}" type="datetimeFigureOut">
               <a:rPr lang="en-US" smtClean="0"/>
-              <a:t>4/18/2019</a:t>
+              <a:t>4/21/2019</a:t>
             </a:fld>
             <a:endParaRPr lang="en-US"/>
           </a:p>
@@ -2361,7 +2363,7 @@
           <a:p>
             <a:fld id="{6175EC6B-8FC9-4EBF-8D89-6FB629DFAA03}" type="datetimeFigureOut">
               <a:rPr lang="en-US" smtClean="0"/>
-              <a:t>4/18/2019</a:t>
+              <a:t>4/21/2019</a:t>
             </a:fld>
             <a:endParaRPr lang="en-US"/>
           </a:p>
@@ -2574,7 +2576,7 @@
           <a:p>
             <a:fld id="{6175EC6B-8FC9-4EBF-8D89-6FB629DFAA03}" type="datetimeFigureOut">
               <a:rPr lang="en-US" smtClean="0"/>
-              <a:t>4/18/2019</a:t>
+              <a:t>4/21/2019</a:t>
             </a:fld>
             <a:endParaRPr lang="en-US"/>
           </a:p>
@@ -2995,7 +2997,7 @@
                 <a16:creationId xmlns:a16="http://schemas.microsoft.com/office/drawing/2014/main" id="{2A8AA5BC-4F7A-4226-8F99-6D824B226A97}"/>
               </a:ext>
               <a:ext uri="{C183D7F6-B498-43B3-948B-1728B52AA6E4}">
-                <adec:decorative xmlns:adec="http://schemas.microsoft.com/office/drawing/2017/decorative" xmlns="" val="1"/>
+                <adec:decorative xmlns:adec="http://schemas.microsoft.com/office/drawing/2017/decorative" val="1"/>
               </a:ext>
             </a:extLst>
           </p:cNvPr>
@@ -3058,7 +3060,7 @@
                 <a16:creationId xmlns:a16="http://schemas.microsoft.com/office/drawing/2014/main" id="{3E5445C6-DD42-4979-86FF-03730E8C6DB0}"/>
               </a:ext>
               <a:ext uri="{C183D7F6-B498-43B3-948B-1728B52AA6E4}">
-                <adec:decorative xmlns:adec="http://schemas.microsoft.com/office/drawing/2017/decorative" xmlns="" val="1"/>
+                <adec:decorative xmlns:adec="http://schemas.microsoft.com/office/drawing/2017/decorative" val="1"/>
               </a:ext>
             </a:extLst>
           </p:cNvPr>
@@ -3210,7 +3212,7 @@
                 <a16:creationId xmlns:a16="http://schemas.microsoft.com/office/drawing/2014/main" id="{45000665-DFC7-417E-8FD7-516A0F15C975}"/>
               </a:ext>
               <a:ext uri="{C183D7F6-B498-43B3-948B-1728B52AA6E4}">
-                <adec:decorative xmlns:adec="http://schemas.microsoft.com/office/drawing/2017/decorative" xmlns="" val="1"/>
+                <adec:decorative xmlns:adec="http://schemas.microsoft.com/office/drawing/2017/decorative" val="1"/>
               </a:ext>
             </a:extLst>
           </p:cNvPr>
@@ -3304,10 +3306,9 @@
           <a:lstStyle/>
           <a:p>
             <a:r>
-              <a:rPr lang="en-US" sz="7200" dirty="0" smtClean="0"/>
+              <a:rPr lang="en-US" sz="7200" dirty="0"/>
               <a:t>Overview</a:t>
             </a:r>
-            <a:endParaRPr lang="en-US" sz="7200" dirty="0"/>
           </a:p>
         </p:txBody>
       </p:sp>
@@ -3329,38 +3330,53 @@
           <a:lstStyle/>
           <a:p>
             <a:r>
-              <a:rPr lang="en-US" sz="3600" dirty="0" smtClean="0"/>
+              <a:rPr lang="en-US" sz="3600" dirty="0"/>
               <a:t>Sean</a:t>
             </a:r>
           </a:p>
           <a:p>
             <a:pPr lvl="1"/>
             <a:r>
-              <a:rPr lang="en-US" sz="3200" dirty="0" smtClean="0"/>
+              <a:rPr lang="en-US" sz="3200" dirty="0"/>
               <a:t>Why PCI -&gt; </a:t>
             </a:r>
             <a:r>
-              <a:rPr lang="en-US" sz="3200" dirty="0" err="1" smtClean="0"/>
+              <a:rPr lang="en-US" sz="3200" dirty="0" err="1"/>
               <a:t>PCIe</a:t>
             </a:r>
-            <a:endParaRPr lang="en-US" sz="3200" dirty="0" smtClean="0"/>
+            <a:endParaRPr lang="en-US" sz="3200" dirty="0"/>
           </a:p>
           <a:p>
             <a:pPr lvl="1"/>
             <a:r>
-              <a:rPr lang="en-US" sz="3200" dirty="0" smtClean="0"/>
+              <a:rPr lang="en-US" sz="3200" dirty="0"/>
               <a:t>Small nuances and confusion about backwards compatibility (software vs hardware)</a:t>
             </a:r>
           </a:p>
           <a:p>
             <a:r>
-              <a:rPr lang="en-US" sz="3600" dirty="0" smtClean="0"/>
+              <a:rPr lang="en-US" sz="3600" dirty="0"/>
               <a:t>David</a:t>
             </a:r>
           </a:p>
           <a:p>
             <a:pPr lvl="1"/>
-            <a:endParaRPr lang="en-US" sz="3200" dirty="0" smtClean="0"/>
+            <a:r>
+              <a:rPr lang="en-US" sz="3200"/>
+              <a:t>Architecture and connection </a:t>
+            </a:r>
+            <a:r>
+              <a:rPr lang="en-US" sz="3200" dirty="0"/>
+              <a:t>characteristics</a:t>
+            </a:r>
+          </a:p>
+          <a:p>
+            <a:pPr lvl="1"/>
+            <a:endParaRPr lang="en-US" sz="3200" dirty="0"/>
+          </a:p>
+          <a:p>
+            <a:pPr lvl="1"/>
+            <a:endParaRPr lang="en-US" sz="3200" dirty="0"/>
           </a:p>
         </p:txBody>
       </p:sp>
@@ -3416,11 +3432,11 @@
           <a:lstStyle/>
           <a:p>
             <a:r>
-              <a:rPr lang="en-US" dirty="0" smtClean="0"/>
+              <a:rPr lang="en-US" dirty="0"/>
               <a:t>Why PCI-&gt;</a:t>
             </a:r>
             <a:r>
-              <a:rPr lang="en-US" dirty="0" err="1" smtClean="0"/>
+              <a:rPr lang="en-US" dirty="0" err="1"/>
               <a:t>PCIe</a:t>
             </a:r>
             <a:endParaRPr lang="en-US" dirty="0"/>
@@ -3454,7 +3470,7 @@
           <a:lstStyle/>
           <a:p>
             <a:r>
-              <a:rPr lang="en-US" sz="3200" dirty="0" smtClean="0"/>
+              <a:rPr lang="en-US" sz="3200" dirty="0"/>
               <a:t>PCI </a:t>
             </a:r>
           </a:p>
@@ -3462,27 +3478,22 @@
             <a:pPr lvl="1"/>
             <a:r>
               <a:rPr lang="en-US" sz="3200" dirty="0"/>
-              <a:t>T</a:t>
-            </a:r>
-            <a:r>
-              <a:rPr lang="en-US" sz="3200" dirty="0" smtClean="0"/>
-              <a:t>he bus shortcomings</a:t>
-            </a:r>
-          </a:p>
-          <a:p>
-            <a:r>
-              <a:rPr lang="en-US" sz="3200" dirty="0" err="1" smtClean="0"/>
+              <a:t>The bus shortcomings</a:t>
+            </a:r>
+          </a:p>
+          <a:p>
+            <a:r>
+              <a:rPr lang="en-US" sz="3200" dirty="0" err="1"/>
               <a:t>PCIe</a:t>
             </a:r>
-            <a:endParaRPr lang="en-US" sz="3200" dirty="0" smtClean="0"/>
+            <a:endParaRPr lang="en-US" sz="3200" dirty="0"/>
           </a:p>
           <a:p>
             <a:pPr lvl="1"/>
             <a:r>
-              <a:rPr lang="en-US" sz="3200" dirty="0" smtClean="0"/>
+              <a:rPr lang="en-US" sz="3200" dirty="0"/>
               <a:t>Point to point. Simulated bus.</a:t>
             </a:r>
-            <a:endParaRPr lang="en-US" sz="3200" dirty="0"/>
           </a:p>
           <a:p>
             <a:pPr marL="0" indent="0">
@@ -3634,10 +3645,9 @@
           <a:lstStyle/>
           <a:p>
             <a:r>
-              <a:rPr lang="en-US" sz="7200" dirty="0" smtClean="0"/>
+              <a:rPr lang="en-US" sz="7200" dirty="0"/>
               <a:t>Backwards Compatible?</a:t>
             </a:r>
-            <a:endParaRPr lang="en-US" sz="7200" dirty="0"/>
           </a:p>
         </p:txBody>
       </p:sp>
@@ -3659,27 +3669,27 @@
           <a:lstStyle/>
           <a:p>
             <a:r>
-              <a:rPr lang="en-US" sz="6000" dirty="0" smtClean="0"/>
+              <a:rPr lang="en-US" sz="6000" dirty="0"/>
               <a:t>Software </a:t>
             </a:r>
           </a:p>
           <a:p>
             <a:pPr lvl="1"/>
             <a:r>
-              <a:rPr lang="en-US" sz="5600" dirty="0" smtClean="0"/>
+              <a:rPr lang="en-US" sz="5600" dirty="0"/>
               <a:t>Yes</a:t>
             </a:r>
           </a:p>
           <a:p>
             <a:r>
-              <a:rPr lang="en-US" sz="6000" dirty="0" smtClean="0"/>
+              <a:rPr lang="en-US" sz="6000" dirty="0"/>
               <a:t>Hardware</a:t>
             </a:r>
           </a:p>
           <a:p>
             <a:pPr lvl="1"/>
             <a:r>
-              <a:rPr lang="en-US" sz="5600" smtClean="0"/>
+              <a:rPr lang="en-US" sz="5600"/>
               <a:t>No</a:t>
             </a:r>
           </a:p>
@@ -3797,7 +3807,7 @@
             <a:pPr lvl="1"/>
             <a:r>
               <a:rPr lang="en-US" dirty="0"/>
-              <a:t>Connection management, virtual channel control</a:t>
+              <a:t>Connection management (DLLP), virtual channel control</a:t>
             </a:r>
           </a:p>
           <a:p>
@@ -3817,7 +3827,14 @@
             <a:pPr lvl="1"/>
             <a:r>
               <a:rPr lang="en-US" dirty="0"/>
-              <a:t>LVDS signals, 8b/10b encoding</a:t>
+              <a:t>8b/10b logical encoding</a:t>
+            </a:r>
+          </a:p>
+          <a:p>
+            <a:pPr lvl="1"/>
+            <a:r>
+              <a:rPr lang="en-US" dirty="0"/>
+              <a:t>LVDS electrical connection</a:t>
             </a:r>
           </a:p>
         </p:txBody>
@@ -3901,10 +3918,231 @@
       </p:grpSpPr>
       <p:sp>
         <p:nvSpPr>
+          <p:cNvPr id="7" name="Content Placeholder 2">
+            <a:extLst>
+              <a:ext uri="{FF2B5EF4-FFF2-40B4-BE49-F238E27FC236}">
+                <a16:creationId xmlns:a16="http://schemas.microsoft.com/office/drawing/2014/main" id="{2B06B11B-5757-45CB-A9D5-08EC27CBF2DA}"/>
+              </a:ext>
+            </a:extLst>
+          </p:cNvPr>
+          <p:cNvSpPr txBox="1">
+            <a:spLocks/>
+          </p:cNvSpPr>
+          <p:nvPr/>
+        </p:nvSpPr>
+        <p:spPr>
+          <a:xfrm>
+            <a:off x="935181" y="1540305"/>
+            <a:ext cx="8402783" cy="3544599"/>
+          </a:xfrm>
+          <a:prstGeom prst="rect">
+            <a:avLst/>
+          </a:prstGeom>
+        </p:spPr>
+        <p:txBody>
+          <a:bodyPr vert="horz" lIns="91440" tIns="45720" rIns="91440" bIns="45720" rtlCol="0">
+            <a:normAutofit/>
+          </a:bodyPr>
+          <a:lstStyle>
+            <a:lvl1pPr marL="228600" indent="-228600" algn="l" defTabSz="914400" rtl="0" eaLnBrk="1" latinLnBrk="0" hangingPunct="1">
+              <a:lnSpc>
+                <a:spcPct val="90000"/>
+              </a:lnSpc>
+              <a:spcBef>
+                <a:spcPts val="1000"/>
+              </a:spcBef>
+              <a:buFont typeface="Arial" panose="020B0604020202020204" pitchFamily="34" charset="0"/>
+              <a:buChar char="•"/>
+              <a:defRPr sz="2800" kern="1200">
+                <a:solidFill>
+                  <a:schemeClr val="tx1"/>
+                </a:solidFill>
+                <a:latin typeface="+mn-lt"/>
+                <a:ea typeface="+mn-ea"/>
+                <a:cs typeface="+mn-cs"/>
+              </a:defRPr>
+            </a:lvl1pPr>
+            <a:lvl2pPr marL="685800" indent="-228600" algn="l" defTabSz="914400" rtl="0" eaLnBrk="1" latinLnBrk="0" hangingPunct="1">
+              <a:lnSpc>
+                <a:spcPct val="90000"/>
+              </a:lnSpc>
+              <a:spcBef>
+                <a:spcPts val="500"/>
+              </a:spcBef>
+              <a:buFont typeface="Arial" panose="020B0604020202020204" pitchFamily="34" charset="0"/>
+              <a:buChar char="•"/>
+              <a:defRPr sz="2400" kern="1200">
+                <a:solidFill>
+                  <a:schemeClr val="tx1"/>
+                </a:solidFill>
+                <a:latin typeface="+mn-lt"/>
+                <a:ea typeface="+mn-ea"/>
+                <a:cs typeface="+mn-cs"/>
+              </a:defRPr>
+            </a:lvl2pPr>
+            <a:lvl3pPr marL="1143000" indent="-228600" algn="l" defTabSz="914400" rtl="0" eaLnBrk="1" latinLnBrk="0" hangingPunct="1">
+              <a:lnSpc>
+                <a:spcPct val="90000"/>
+              </a:lnSpc>
+              <a:spcBef>
+                <a:spcPts val="500"/>
+              </a:spcBef>
+              <a:buFont typeface="Arial" panose="020B0604020202020204" pitchFamily="34" charset="0"/>
+              <a:buChar char="•"/>
+              <a:defRPr sz="2000" kern="1200">
+                <a:solidFill>
+                  <a:schemeClr val="tx1"/>
+                </a:solidFill>
+                <a:latin typeface="+mn-lt"/>
+                <a:ea typeface="+mn-ea"/>
+                <a:cs typeface="+mn-cs"/>
+              </a:defRPr>
+            </a:lvl3pPr>
+            <a:lvl4pPr marL="1600200" indent="-228600" algn="l" defTabSz="914400" rtl="0" eaLnBrk="1" latinLnBrk="0" hangingPunct="1">
+              <a:lnSpc>
+                <a:spcPct val="90000"/>
+              </a:lnSpc>
+              <a:spcBef>
+                <a:spcPts val="500"/>
+              </a:spcBef>
+              <a:buFont typeface="Arial" panose="020B0604020202020204" pitchFamily="34" charset="0"/>
+              <a:buChar char="•"/>
+              <a:defRPr sz="1800" kern="1200">
+                <a:solidFill>
+                  <a:schemeClr val="tx1"/>
+                </a:solidFill>
+                <a:latin typeface="+mn-lt"/>
+                <a:ea typeface="+mn-ea"/>
+                <a:cs typeface="+mn-cs"/>
+              </a:defRPr>
+            </a:lvl4pPr>
+            <a:lvl5pPr marL="2057400" indent="-228600" algn="l" defTabSz="914400" rtl="0" eaLnBrk="1" latinLnBrk="0" hangingPunct="1">
+              <a:lnSpc>
+                <a:spcPct val="90000"/>
+              </a:lnSpc>
+              <a:spcBef>
+                <a:spcPts val="500"/>
+              </a:spcBef>
+              <a:buFont typeface="Arial" panose="020B0604020202020204" pitchFamily="34" charset="0"/>
+              <a:buChar char="•"/>
+              <a:defRPr sz="1800" kern="1200">
+                <a:solidFill>
+                  <a:schemeClr val="tx1"/>
+                </a:solidFill>
+                <a:latin typeface="+mn-lt"/>
+                <a:ea typeface="+mn-ea"/>
+                <a:cs typeface="+mn-cs"/>
+              </a:defRPr>
+            </a:lvl5pPr>
+            <a:lvl6pPr marL="2514600" indent="-228600" algn="l" defTabSz="914400" rtl="0" eaLnBrk="1" latinLnBrk="0" hangingPunct="1">
+              <a:lnSpc>
+                <a:spcPct val="90000"/>
+              </a:lnSpc>
+              <a:spcBef>
+                <a:spcPts val="500"/>
+              </a:spcBef>
+              <a:buFont typeface="Arial" panose="020B0604020202020204" pitchFamily="34" charset="0"/>
+              <a:buChar char="•"/>
+              <a:defRPr sz="1800" kern="1200">
+                <a:solidFill>
+                  <a:schemeClr val="tx1"/>
+                </a:solidFill>
+                <a:latin typeface="+mn-lt"/>
+                <a:ea typeface="+mn-ea"/>
+                <a:cs typeface="+mn-cs"/>
+              </a:defRPr>
+            </a:lvl6pPr>
+            <a:lvl7pPr marL="2971800" indent="-228600" algn="l" defTabSz="914400" rtl="0" eaLnBrk="1" latinLnBrk="0" hangingPunct="1">
+              <a:lnSpc>
+                <a:spcPct val="90000"/>
+              </a:lnSpc>
+              <a:spcBef>
+                <a:spcPts val="500"/>
+              </a:spcBef>
+              <a:buFont typeface="Arial" panose="020B0604020202020204" pitchFamily="34" charset="0"/>
+              <a:buChar char="•"/>
+              <a:defRPr sz="1800" kern="1200">
+                <a:solidFill>
+                  <a:schemeClr val="tx1"/>
+                </a:solidFill>
+                <a:latin typeface="+mn-lt"/>
+                <a:ea typeface="+mn-ea"/>
+                <a:cs typeface="+mn-cs"/>
+              </a:defRPr>
+            </a:lvl7pPr>
+            <a:lvl8pPr marL="3429000" indent="-228600" algn="l" defTabSz="914400" rtl="0" eaLnBrk="1" latinLnBrk="0" hangingPunct="1">
+              <a:lnSpc>
+                <a:spcPct val="90000"/>
+              </a:lnSpc>
+              <a:spcBef>
+                <a:spcPts val="500"/>
+              </a:spcBef>
+              <a:buFont typeface="Arial" panose="020B0604020202020204" pitchFamily="34" charset="0"/>
+              <a:buChar char="•"/>
+              <a:defRPr sz="1800" kern="1200">
+                <a:solidFill>
+                  <a:schemeClr val="tx1"/>
+                </a:solidFill>
+                <a:latin typeface="+mn-lt"/>
+                <a:ea typeface="+mn-ea"/>
+                <a:cs typeface="+mn-cs"/>
+              </a:defRPr>
+            </a:lvl8pPr>
+            <a:lvl9pPr marL="3886200" indent="-228600" algn="l" defTabSz="914400" rtl="0" eaLnBrk="1" latinLnBrk="0" hangingPunct="1">
+              <a:lnSpc>
+                <a:spcPct val="90000"/>
+              </a:lnSpc>
+              <a:spcBef>
+                <a:spcPts val="500"/>
+              </a:spcBef>
+              <a:buFont typeface="Arial" panose="020B0604020202020204" pitchFamily="34" charset="0"/>
+              <a:buChar char="•"/>
+              <a:defRPr sz="1800" kern="1200">
+                <a:solidFill>
+                  <a:schemeClr val="tx1"/>
+                </a:solidFill>
+                <a:latin typeface="+mn-lt"/>
+                <a:ea typeface="+mn-ea"/>
+                <a:cs typeface="+mn-cs"/>
+              </a:defRPr>
+            </a:lvl9pPr>
+          </a:lstStyle>
+          <a:p>
+            <a:r>
+              <a:rPr lang="en-US" dirty="0"/>
+              <a:t>TLP – for component read/write</a:t>
+            </a:r>
+          </a:p>
+          <a:p>
+            <a:pPr lvl="1"/>
+            <a:r>
+              <a:rPr lang="en-US" dirty="0"/>
+              <a:t>Different length and contents depending on format and type</a:t>
+            </a:r>
+          </a:p>
+          <a:p>
+            <a:endParaRPr lang="en-US" dirty="0"/>
+          </a:p>
+          <a:p>
+            <a:endParaRPr lang="en-US" dirty="0"/>
+          </a:p>
+          <a:p>
+            <a:endParaRPr lang="en-US" dirty="0"/>
+          </a:p>
+          <a:p>
+            <a:r>
+              <a:rPr lang="en-US" dirty="0"/>
+              <a:t>DLLP – for link control metadata</a:t>
+            </a:r>
+          </a:p>
+        </p:txBody>
+      </p:sp>
+      <p:sp>
+        <p:nvSpPr>
           <p:cNvPr id="2" name="Title 1">
             <a:extLst>
               <a:ext uri="{FF2B5EF4-FFF2-40B4-BE49-F238E27FC236}">
-                <a16:creationId xmlns:a16="http://schemas.microsoft.com/office/drawing/2014/main" id="{FD77BC2C-1064-4A23-AB7D-5528F08165ED}"/>
+                <a16:creationId xmlns:a16="http://schemas.microsoft.com/office/drawing/2014/main" id="{71CA9F2E-2AD4-49D9-85BD-0DCCE1AE0628}"/>
               </a:ext>
             </a:extLst>
           </p:cNvPr>
@@ -3922,63 +4160,26 @@
           <a:p>
             <a:r>
               <a:rPr lang="en-US" dirty="0"/>
-              <a:t>Connection</a:t>
-            </a:r>
-          </a:p>
-        </p:txBody>
-      </p:sp>
-      <p:sp>
-        <p:nvSpPr>
-          <p:cNvPr id="3" name="Content Placeholder 2">
+              <a:t>Packet Structure</a:t>
+            </a:r>
+          </a:p>
+        </p:txBody>
+      </p:sp>
+      <p:pic>
+        <p:nvPicPr>
+          <p:cNvPr id="5" name="Content Placeholder 4" descr="A close up of a clock&#10;&#10;Description automatically generated">
             <a:extLst>
               <a:ext uri="{FF2B5EF4-FFF2-40B4-BE49-F238E27FC236}">
-                <a16:creationId xmlns:a16="http://schemas.microsoft.com/office/drawing/2014/main" id="{51D74F72-3B60-41BC-933D-EBB263162D74}"/>
-              </a:ext>
-            </a:extLst>
-          </p:cNvPr>
-          <p:cNvSpPr>
-            <a:spLocks noGrp="1"/>
-          </p:cNvSpPr>
-          <p:nvPr>
-            <p:ph idx="1"/>
-          </p:nvPr>
-        </p:nvSpPr>
-        <p:spPr>
-          <a:xfrm>
-            <a:off x="838200" y="1825625"/>
-            <a:ext cx="7391400" cy="4351338"/>
-          </a:xfrm>
-        </p:spPr>
-        <p:txBody>
-          <a:bodyPr/>
-          <a:lstStyle/>
-          <a:p>
-            <a:r>
-              <a:rPr lang="en-US" dirty="0"/>
-              <a:t>FSM in each PCIe device for connection state</a:t>
-            </a:r>
-          </a:p>
-          <a:p>
-            <a:r>
-              <a:rPr lang="en-US" dirty="0"/>
-              <a:t>Data link layer manages starting connection for new devices, through DLLP</a:t>
-            </a:r>
-          </a:p>
-        </p:txBody>
-      </p:sp>
-      <p:pic>
-        <p:nvPicPr>
-          <p:cNvPr id="2050" name="Picture 2" descr="Data link control and management state machine diagram">
-            <a:extLst>
-              <a:ext uri="{FF2B5EF4-FFF2-40B4-BE49-F238E27FC236}">
-                <a16:creationId xmlns:a16="http://schemas.microsoft.com/office/drawing/2014/main" id="{5F63BA56-9E90-4C51-8895-CA03BE169B8E}"/>
+                <a16:creationId xmlns:a16="http://schemas.microsoft.com/office/drawing/2014/main" id="{5F978079-AB48-4E00-B4A0-EA8F43CFF1D5}"/>
               </a:ext>
             </a:extLst>
           </p:cNvPr>
           <p:cNvPicPr>
-            <a:picLocks noChangeAspect="1" noChangeArrowheads="1"/>
+            <a:picLocks noGrp="1" noChangeAspect="1"/>
           </p:cNvPicPr>
-          <p:nvPr/>
+          <p:nvPr>
+            <p:ph idx="1"/>
+          </p:nvPr>
         </p:nvPicPr>
         <p:blipFill>
           <a:blip r:embed="rId2">
@@ -3988,35 +4189,57 @@
               </a:ext>
             </a:extLst>
           </a:blip>
-          <a:srcRect/>
           <a:stretch>
             <a:fillRect/>
           </a:stretch>
         </p:blipFill>
-        <p:spPr bwMode="auto">
+        <p:spPr>
           <a:xfrm>
-            <a:off x="8935656" y="1090726"/>
-            <a:ext cx="3054752" cy="5086237"/>
+            <a:off x="1285340" y="2601685"/>
+            <a:ext cx="6523748" cy="1036004"/>
+          </a:xfrm>
+        </p:spPr>
+      </p:pic>
+      <p:pic>
+        <p:nvPicPr>
+          <p:cNvPr id="8" name="Picture 7" descr="A close up of a logo&#10;&#10;Description automatically generated">
+            <a:extLst>
+              <a:ext uri="{FF2B5EF4-FFF2-40B4-BE49-F238E27FC236}">
+                <a16:creationId xmlns:a16="http://schemas.microsoft.com/office/drawing/2014/main" id="{BE038F86-A4D3-41B9-BF38-E7D25A644276}"/>
+              </a:ext>
+            </a:extLst>
+          </p:cNvPr>
+          <p:cNvPicPr>
+            <a:picLocks noChangeAspect="1"/>
+          </p:cNvPicPr>
+          <p:nvPr/>
+        </p:nvPicPr>
+        <p:blipFill>
+          <a:blip r:embed="rId3">
+            <a:extLst>
+              <a:ext uri="{28A0092B-C50C-407E-A947-70E740481C1C}">
+                <a14:useLocalDpi xmlns:a14="http://schemas.microsoft.com/office/drawing/2010/main" val="0"/>
+              </a:ext>
+            </a:extLst>
+          </a:blip>
+          <a:stretch>
+            <a:fillRect/>
+          </a:stretch>
+        </p:blipFill>
+        <p:spPr>
+          <a:xfrm>
+            <a:off x="1285340" y="4807813"/>
+            <a:ext cx="6523748" cy="1395730"/>
           </a:xfrm>
           <a:prstGeom prst="rect">
             <a:avLst/>
           </a:prstGeom>
-          <a:noFill/>
-          <a:extLst>
-            <a:ext uri="{909E8E84-426E-40DD-AFC4-6F175D3DCCD1}">
-              <a14:hiddenFill xmlns:a14="http://schemas.microsoft.com/office/drawing/2010/main">
-                <a:solidFill>
-                  <a:srgbClr val="FFFFFF"/>
-                </a:solidFill>
-              </a14:hiddenFill>
-            </a:ext>
-          </a:extLst>
         </p:spPr>
       </p:pic>
     </p:spTree>
     <p:extLst>
       <p:ext uri="{BB962C8B-B14F-4D97-AF65-F5344CB8AC3E}">
-        <p14:creationId xmlns:p14="http://schemas.microsoft.com/office/powerpoint/2010/main" val="114281154"/>
+        <p14:creationId xmlns:p14="http://schemas.microsoft.com/office/powerpoint/2010/main" val="3377789020"/>
       </p:ext>
     </p:extLst>
   </p:cSld>
@@ -4048,7 +4271,7 @@
           <p:cNvPr id="2" name="Title 1">
             <a:extLst>
               <a:ext uri="{FF2B5EF4-FFF2-40B4-BE49-F238E27FC236}">
-                <a16:creationId xmlns:a16="http://schemas.microsoft.com/office/drawing/2014/main" id="{71CA9F2E-2AD4-49D9-85BD-0DCCE1AE0628}"/>
+                <a16:creationId xmlns:a16="http://schemas.microsoft.com/office/drawing/2014/main" id="{FD77BC2C-1064-4A23-AB7D-5528F08165ED}"/>
               </a:ext>
             </a:extLst>
           </p:cNvPr>
@@ -4066,7 +4289,7 @@
           <a:p>
             <a:r>
               <a:rPr lang="en-US" dirty="0"/>
-              <a:t>TLP Packet Structure</a:t>
+              <a:t>Connection</a:t>
             </a:r>
           </a:p>
         </p:txBody>
@@ -4076,7 +4299,7 @@
           <p:cNvPr id="3" name="Content Placeholder 2">
             <a:extLst>
               <a:ext uri="{FF2B5EF4-FFF2-40B4-BE49-F238E27FC236}">
-                <a16:creationId xmlns:a16="http://schemas.microsoft.com/office/drawing/2014/main" id="{CB1E4D04-12D2-499D-87E0-6E0AC4635350}"/>
+                <a16:creationId xmlns:a16="http://schemas.microsoft.com/office/drawing/2014/main" id="{51D74F72-3B60-41BC-933D-EBB263162D74}"/>
               </a:ext>
             </a:extLst>
           </p:cNvPr>
@@ -4089,29 +4312,41 @@
         </p:nvSpPr>
         <p:spPr>
           <a:xfrm>
-            <a:off x="838200" y="1825625"/>
-            <a:ext cx="6453851" cy="4351338"/>
+            <a:off x="457200" y="1572491"/>
+            <a:ext cx="11353800" cy="4604472"/>
           </a:xfrm>
         </p:spPr>
         <p:txBody>
           <a:bodyPr/>
           <a:lstStyle/>
           <a:p>
+            <a:r>
+              <a:rPr lang="en-US" dirty="0"/>
+              <a:t>Data link layer manages starting connection for new devices, through DLLPs</a:t>
+            </a:r>
+          </a:p>
+          <a:p>
+            <a:r>
+              <a:rPr lang="en-US" dirty="0"/>
+              <a:t>Each message has traffic class (TC) mapped to virtual channel (VC)</a:t>
+            </a:r>
+          </a:p>
+          <a:p>
             <a:endParaRPr lang="en-US" dirty="0"/>
           </a:p>
         </p:txBody>
       </p:sp>
       <p:pic>
         <p:nvPicPr>
-          <p:cNvPr id="4098" name="Picture 2" descr="PCIe TLP header">
+          <p:cNvPr id="5" name="Picture 4" descr="A close up of a map&#10;&#10;Description automatically generated">
             <a:extLst>
               <a:ext uri="{FF2B5EF4-FFF2-40B4-BE49-F238E27FC236}">
-                <a16:creationId xmlns:a16="http://schemas.microsoft.com/office/drawing/2014/main" id="{FB91E790-75BF-46F2-B476-A8C6C7E5C0B7}"/>
+                <a16:creationId xmlns:a16="http://schemas.microsoft.com/office/drawing/2014/main" id="{5B30C6D5-6C54-40F5-8857-C8E35D3A8E4D}"/>
               </a:ext>
             </a:extLst>
           </p:cNvPr>
           <p:cNvPicPr>
-            <a:picLocks noChangeAspect="1" noChangeArrowheads="1"/>
+            <a:picLocks noChangeAspect="1"/>
           </p:cNvPicPr>
           <p:nvPr/>
         </p:nvPicPr>
@@ -4123,35 +4358,205 @@
               </a:ext>
             </a:extLst>
           </a:blip>
-          <a:srcRect/>
           <a:stretch>
             <a:fillRect/>
           </a:stretch>
         </p:blipFill>
-        <p:spPr bwMode="auto">
+        <p:spPr>
           <a:xfrm>
-            <a:off x="7805135" y="2145898"/>
-            <a:ext cx="4105275" cy="876300"/>
+            <a:off x="3287835" y="3228110"/>
+            <a:ext cx="5692529" cy="3118427"/>
           </a:xfrm>
           <a:prstGeom prst="rect">
             <a:avLst/>
           </a:prstGeom>
-          <a:noFill/>
-          <a:extLst>
-            <a:ext uri="{909E8E84-426E-40DD-AFC4-6F175D3DCCD1}">
-              <a14:hiddenFill xmlns:a14="http://schemas.microsoft.com/office/drawing/2010/main">
-                <a:solidFill>
-                  <a:srgbClr val="FFFFFF"/>
-                </a:solidFill>
-              </a14:hiddenFill>
-            </a:ext>
-          </a:extLst>
         </p:spPr>
       </p:pic>
     </p:spTree>
     <p:extLst>
       <p:ext uri="{BB962C8B-B14F-4D97-AF65-F5344CB8AC3E}">
-        <p14:creationId xmlns:p14="http://schemas.microsoft.com/office/powerpoint/2010/main" val="3377789020"/>
+        <p14:creationId xmlns:p14="http://schemas.microsoft.com/office/powerpoint/2010/main" val="114281154"/>
+      </p:ext>
+    </p:extLst>
+  </p:cSld>
+  <p:clrMapOvr>
+    <a:masterClrMapping/>
+  </p:clrMapOvr>
+</p:sld>
+</file>
+
+<file path=ppt/slides/slide8.xml><?xml version="1.0" encoding="utf-8"?>
+<p:sld xmlns:a="http://schemas.openxmlformats.org/drawingml/2006/main" xmlns:r="http://schemas.openxmlformats.org/officeDocument/2006/relationships" xmlns:p="http://schemas.openxmlformats.org/presentationml/2006/main">
+  <p:cSld>
+    <p:spTree>
+      <p:nvGrpSpPr>
+        <p:cNvPr id="1" name=""/>
+        <p:cNvGrpSpPr/>
+        <p:nvPr/>
+      </p:nvGrpSpPr>
+      <p:grpSpPr>
+        <a:xfrm>
+          <a:off x="0" y="0"/>
+          <a:ext cx="0" cy="0"/>
+          <a:chOff x="0" y="0"/>
+          <a:chExt cx="0" cy="0"/>
+        </a:xfrm>
+      </p:grpSpPr>
+      <p:sp>
+        <p:nvSpPr>
+          <p:cNvPr id="2" name="Title 1">
+            <a:extLst>
+              <a:ext uri="{FF2B5EF4-FFF2-40B4-BE49-F238E27FC236}">
+                <a16:creationId xmlns:a16="http://schemas.microsoft.com/office/drawing/2014/main" id="{5EC8A740-7947-450B-8EFB-764B8C5D0050}"/>
+              </a:ext>
+            </a:extLst>
+          </p:cNvPr>
+          <p:cNvSpPr>
+            <a:spLocks noGrp="1"/>
+          </p:cNvSpPr>
+          <p:nvPr>
+            <p:ph type="title"/>
+          </p:nvPr>
+        </p:nvSpPr>
+        <p:spPr/>
+        <p:txBody>
+          <a:bodyPr/>
+          <a:lstStyle/>
+          <a:p>
+            <a:r>
+              <a:rPr lang="en-US" dirty="0"/>
+              <a:t>Conclusion (is this necessary?)</a:t>
+            </a:r>
+          </a:p>
+        </p:txBody>
+      </p:sp>
+      <p:sp>
+        <p:nvSpPr>
+          <p:cNvPr id="3" name="Content Placeholder 2">
+            <a:extLst>
+              <a:ext uri="{FF2B5EF4-FFF2-40B4-BE49-F238E27FC236}">
+                <a16:creationId xmlns:a16="http://schemas.microsoft.com/office/drawing/2014/main" id="{3A72A0F0-8BC0-4904-BFF6-572CB719E782}"/>
+              </a:ext>
+            </a:extLst>
+          </p:cNvPr>
+          <p:cNvSpPr>
+            <a:spLocks noGrp="1"/>
+          </p:cNvSpPr>
+          <p:nvPr>
+            <p:ph idx="1"/>
+          </p:nvPr>
+        </p:nvSpPr>
+        <p:spPr/>
+        <p:txBody>
+          <a:bodyPr/>
+          <a:lstStyle/>
+          <a:p>
+            <a:r>
+              <a:rPr lang="en-US" dirty="0"/>
+              <a:t>PCIe demonstrates a movement away from parallel buses</a:t>
+            </a:r>
+          </a:p>
+          <a:p>
+            <a:r>
+              <a:rPr lang="en-US" dirty="0"/>
+              <a:t>Virtual bus replaces physical bus connections with point-to-point</a:t>
+            </a:r>
+          </a:p>
+          <a:p>
+            <a:endParaRPr lang="en-US" dirty="0"/>
+          </a:p>
+          <a:p>
+            <a:endParaRPr lang="en-US" dirty="0"/>
+          </a:p>
+        </p:txBody>
+      </p:sp>
+    </p:spTree>
+    <p:extLst>
+      <p:ext uri="{BB962C8B-B14F-4D97-AF65-F5344CB8AC3E}">
+        <p14:creationId xmlns:p14="http://schemas.microsoft.com/office/powerpoint/2010/main" val="1862620054"/>
+      </p:ext>
+    </p:extLst>
+  </p:cSld>
+  <p:clrMapOvr>
+    <a:masterClrMapping/>
+  </p:clrMapOvr>
+</p:sld>
+</file>
+
+<file path=ppt/slides/slide9.xml><?xml version="1.0" encoding="utf-8"?>
+<p:sld xmlns:a="http://schemas.openxmlformats.org/drawingml/2006/main" xmlns:r="http://schemas.openxmlformats.org/officeDocument/2006/relationships" xmlns:p="http://schemas.openxmlformats.org/presentationml/2006/main">
+  <p:cSld>
+    <p:spTree>
+      <p:nvGrpSpPr>
+        <p:cNvPr id="1" name=""/>
+        <p:cNvGrpSpPr/>
+        <p:nvPr/>
+      </p:nvGrpSpPr>
+      <p:grpSpPr>
+        <a:xfrm>
+          <a:off x="0" y="0"/>
+          <a:ext cx="0" cy="0"/>
+          <a:chOff x="0" y="0"/>
+          <a:chExt cx="0" cy="0"/>
+        </a:xfrm>
+      </p:grpSpPr>
+      <p:sp>
+        <p:nvSpPr>
+          <p:cNvPr id="2" name="Title 1">
+            <a:extLst>
+              <a:ext uri="{FF2B5EF4-FFF2-40B4-BE49-F238E27FC236}">
+                <a16:creationId xmlns:a16="http://schemas.microsoft.com/office/drawing/2014/main" id="{00371BEF-818B-4C18-BCCE-A95F05FF3141}"/>
+              </a:ext>
+            </a:extLst>
+          </p:cNvPr>
+          <p:cNvSpPr>
+            <a:spLocks noGrp="1"/>
+          </p:cNvSpPr>
+          <p:nvPr>
+            <p:ph type="title"/>
+          </p:nvPr>
+        </p:nvSpPr>
+        <p:spPr/>
+        <p:txBody>
+          <a:bodyPr/>
+          <a:lstStyle/>
+          <a:p>
+            <a:r>
+              <a:rPr lang="en-US" dirty="0"/>
+              <a:t>Questions?</a:t>
+            </a:r>
+          </a:p>
+        </p:txBody>
+      </p:sp>
+      <p:sp>
+        <p:nvSpPr>
+          <p:cNvPr id="3" name="Content Placeholder 2">
+            <a:extLst>
+              <a:ext uri="{FF2B5EF4-FFF2-40B4-BE49-F238E27FC236}">
+                <a16:creationId xmlns:a16="http://schemas.microsoft.com/office/drawing/2014/main" id="{515F51D0-930D-4351-B10A-7807BE7A1404}"/>
+              </a:ext>
+            </a:extLst>
+          </p:cNvPr>
+          <p:cNvSpPr>
+            <a:spLocks noGrp="1"/>
+          </p:cNvSpPr>
+          <p:nvPr>
+            <p:ph idx="1"/>
+          </p:nvPr>
+        </p:nvSpPr>
+        <p:spPr/>
+        <p:txBody>
+          <a:bodyPr/>
+          <a:lstStyle/>
+          <a:p>
+            <a:endParaRPr lang="en-US"/>
+          </a:p>
+        </p:txBody>
+      </p:sp>
+    </p:spTree>
+    <p:extLst>
+      <p:ext uri="{BB962C8B-B14F-4D97-AF65-F5344CB8AC3E}">
+        <p14:creationId xmlns:p14="http://schemas.microsoft.com/office/powerpoint/2010/main" val="3322292519"/>
       </p:ext>
     </p:extLst>
   </p:cSld>

</xml_diff>